<commit_message>
*Update to Powerpoint *Added SoftwareApprover example *Provided templates for User and HELL IT Staff maps
</commit_message>
<xml_diff>
--- a/Milestone 3/Milestone3.pptx
+++ b/Milestone 3/Milestone3.pptx
@@ -7,8 +7,14 @@
   <p:sldIdLst>
     <p:sldId id="256" r:id="rId2"/>
     <p:sldId id="257" r:id="rId3"/>
-    <p:sldId id="262" r:id="rId4"/>
-    <p:sldId id="258" r:id="rId5"/>
+    <p:sldId id="266" r:id="rId4"/>
+    <p:sldId id="269" r:id="rId5"/>
+    <p:sldId id="265" r:id="rId6"/>
+    <p:sldId id="268" r:id="rId7"/>
+    <p:sldId id="267" r:id="rId8"/>
+    <p:sldId id="270" r:id="rId9"/>
+    <p:sldId id="262" r:id="rId10"/>
+    <p:sldId id="258" r:id="rId11"/>
   </p:sldIdLst>
   <p:sldSz cx="12192000" cy="6858000"/>
   <p:notesSz cx="6858000" cy="9144000"/>
@@ -139,7 +145,7 @@
   </p:defaultTextStyle>
   <p:extLst>
     <p:ext uri="{EFAFB233-063F-42B5-8137-9DF3F51BA10A}">
-      <p15:sldGuideLst xmlns:p15="http://schemas.microsoft.com/office/powerpoint/2012/main"/>
+      <p15:sldGuideLst xmlns:p15="http://schemas.microsoft.com/office/powerpoint/2012/main" xmlns=""/>
     </p:ext>
   </p:extLst>
 </p:presentation>
@@ -707,7 +713,7 @@
               <a:pPr>
                 <a:defRPr/>
               </a:pPr>
-              <a:t>2018-01-31</a:t>
+              <a:t>2018-01-30</a:t>
             </a:fld>
             <a:endParaRPr lang="en-CA"/>
           </a:p>
@@ -1031,7 +1037,7 @@
               <a:pPr>
                 <a:defRPr/>
               </a:pPr>
-              <a:t>2018-01-31</a:t>
+              <a:t>2018-01-30</a:t>
             </a:fld>
             <a:endParaRPr lang="en-CA"/>
           </a:p>
@@ -1306,7 +1312,7 @@
               <a:pPr>
                 <a:defRPr/>
               </a:pPr>
-              <a:t>2018-01-31</a:t>
+              <a:t>2018-01-30</a:t>
             </a:fld>
             <a:endParaRPr lang="en-CA"/>
           </a:p>
@@ -1867,7 +1873,7 @@
               <a:pPr>
                 <a:defRPr/>
               </a:pPr>
-              <a:t>2018-01-31</a:t>
+              <a:t>2018-01-30</a:t>
             </a:fld>
             <a:endParaRPr lang="en-CA"/>
           </a:p>
@@ -2142,7 +2148,7 @@
               <a:pPr>
                 <a:defRPr/>
               </a:pPr>
-              <a:t>2018-01-31</a:t>
+              <a:t>2018-01-30</a:t>
             </a:fld>
             <a:endParaRPr lang="en-CA"/>
           </a:p>
@@ -2690,7 +2696,7 @@
               <a:pPr>
                 <a:defRPr/>
               </a:pPr>
-              <a:t>2018-01-31</a:t>
+              <a:t>2018-01-30</a:t>
             </a:fld>
             <a:endParaRPr lang="en-CA"/>
           </a:p>
@@ -3009,7 +3015,7 @@
               <a:pPr>
                 <a:defRPr/>
               </a:pPr>
-              <a:t>2018-01-31</a:t>
+              <a:t>2018-01-30</a:t>
             </a:fld>
             <a:endParaRPr lang="en-CA"/>
           </a:p>
@@ -3210,7 +3216,7 @@
               <a:pPr>
                 <a:defRPr/>
               </a:pPr>
-              <a:t>2018-01-31</a:t>
+              <a:t>2018-01-30</a:t>
             </a:fld>
             <a:endParaRPr lang="en-CA"/>
           </a:p>
@@ -3417,7 +3423,7 @@
               <a:pPr>
                 <a:defRPr/>
               </a:pPr>
-              <a:t>2018-01-31</a:t>
+              <a:t>2018-01-30</a:t>
             </a:fld>
             <a:endParaRPr lang="en-CA"/>
           </a:p>
@@ -3614,7 +3620,7 @@
               <a:pPr>
                 <a:defRPr/>
               </a:pPr>
-              <a:t>2018-01-31</a:t>
+              <a:t>2018-01-30</a:t>
             </a:fld>
             <a:endParaRPr lang="en-CA"/>
           </a:p>
@@ -3892,7 +3898,7 @@
               <a:pPr>
                 <a:defRPr/>
               </a:pPr>
-              <a:t>2018-01-31</a:t>
+              <a:t>2018-01-30</a:t>
             </a:fld>
             <a:endParaRPr lang="en-CA"/>
           </a:p>
@@ -4216,7 +4222,7 @@
               <a:pPr>
                 <a:defRPr/>
               </a:pPr>
-              <a:t>2018-01-31</a:t>
+              <a:t>2018-01-30</a:t>
             </a:fld>
             <a:endParaRPr lang="en-CA"/>
           </a:p>
@@ -4685,7 +4691,7 @@
               <a:pPr>
                 <a:defRPr/>
               </a:pPr>
-              <a:t>2018-01-31</a:t>
+              <a:t>2018-01-30</a:t>
             </a:fld>
             <a:endParaRPr lang="en-CA"/>
           </a:p>
@@ -4830,7 +4836,7 @@
               <a:pPr>
                 <a:defRPr/>
               </a:pPr>
-              <a:t>2018-01-31</a:t>
+              <a:t>2018-01-30</a:t>
             </a:fld>
             <a:endParaRPr lang="en-CA"/>
           </a:p>
@@ -4952,7 +4958,7 @@
               <a:pPr>
                 <a:defRPr/>
               </a:pPr>
-              <a:t>2018-01-31</a:t>
+              <a:t>2018-01-30</a:t>
             </a:fld>
             <a:endParaRPr lang="en-CA"/>
           </a:p>
@@ -5262,7 +5268,7 @@
               <a:pPr>
                 <a:defRPr/>
               </a:pPr>
-              <a:t>2018-01-31</a:t>
+              <a:t>2018-01-30</a:t>
             </a:fld>
             <a:endParaRPr lang="en-CA"/>
           </a:p>
@@ -5581,7 +5587,7 @@
               <a:pPr>
                 <a:defRPr/>
               </a:pPr>
-              <a:t>2018-01-31</a:t>
+              <a:t>2018-01-30</a:t>
             </a:fld>
             <a:endParaRPr lang="en-CA"/>
           </a:p>
@@ -6232,7 +6238,7 @@
               <a:pPr>
                 <a:defRPr/>
               </a:pPr>
-              <a:t>2018-01-31</a:t>
+              <a:t>2018-01-30</a:t>
             </a:fld>
             <a:endParaRPr lang="en-CA"/>
           </a:p>
@@ -6873,6 +6879,245 @@
 </p:sld>
 </file>
 
+<file path=ppt/slides/slide10.xml><?xml version="1.0" encoding="utf-8"?>
+<p:sld xmlns:a="http://schemas.openxmlformats.org/drawingml/2006/main" xmlns:r="http://schemas.openxmlformats.org/officeDocument/2006/relationships" xmlns:p="http://schemas.openxmlformats.org/presentationml/2006/main">
+  <p:cSld>
+    <p:spTree>
+      <p:nvGrpSpPr>
+        <p:cNvPr id="1" name=""/>
+        <p:cNvGrpSpPr/>
+        <p:nvPr/>
+      </p:nvGrpSpPr>
+      <p:grpSpPr>
+        <a:xfrm>
+          <a:off x="0" y="0"/>
+          <a:ext cx="0" cy="0"/>
+          <a:chOff x="0" y="0"/>
+          <a:chExt cx="0" cy="0"/>
+        </a:xfrm>
+      </p:grpSpPr>
+      <p:sp>
+        <p:nvSpPr>
+          <p:cNvPr id="9218" name="Title 1"/>
+          <p:cNvSpPr>
+            <a:spLocks noGrp="1" noChangeArrowheads="1"/>
+          </p:cNvSpPr>
+          <p:nvPr>
+            <p:ph type="title"/>
+          </p:nvPr>
+        </p:nvSpPr>
+        <p:spPr>
+          <a:xfrm>
+            <a:off x="1484313" y="152400"/>
+            <a:ext cx="10018712" cy="1752600"/>
+          </a:xfrm>
+        </p:spPr>
+        <p:txBody>
+          <a:bodyPr/>
+          <a:lstStyle/>
+          <a:p>
+            <a:r>
+              <a:rPr lang="en-US" altLang="en-US">
+                <a:ln>
+                  <a:noFill/>
+                </a:ln>
+              </a:rPr>
+              <a:t>Group reflection</a:t>
+            </a:r>
+            <a:endParaRPr lang="en-CA" altLang="en-US">
+              <a:ln>
+                <a:noFill/>
+              </a:ln>
+            </a:endParaRPr>
+          </a:p>
+        </p:txBody>
+      </p:sp>
+      <p:sp>
+        <p:nvSpPr>
+          <p:cNvPr id="3" name="Content Placeholder 2">
+            <a:extLst/>
+          </p:cNvPr>
+          <p:cNvSpPr>
+            <a:spLocks noGrp="1"/>
+          </p:cNvSpPr>
+          <p:nvPr>
+            <p:ph idx="1"/>
+          </p:nvPr>
+        </p:nvSpPr>
+        <p:spPr>
+          <a:xfrm>
+            <a:off x="1484313" y="1905000"/>
+            <a:ext cx="10018712" cy="3886200"/>
+          </a:xfrm>
+        </p:spPr>
+        <p:txBody>
+          <a:bodyPr rtlCol="0">
+            <a:normAutofit fontScale="85000" lnSpcReduction="10000"/>
+          </a:bodyPr>
+          <a:lstStyle/>
+          <a:p>
+            <a:pPr fontAlgn="auto">
+              <a:spcAft>
+                <a:spcPts val="0"/>
+              </a:spcAft>
+              <a:buClr>
+                <a:schemeClr val="accent1">
+                  <a:lumMod val="75000"/>
+                </a:schemeClr>
+              </a:buClr>
+              <a:buFont typeface="Arial"/>
+              <a:buChar char="•"/>
+              <a:defRPr/>
+            </a:pPr>
+            <a:r>
+              <a:rPr lang="en-US" dirty="0"/>
+              <a:t>How did you feel about this milestone? What did you like about it? What did you dislike?</a:t>
+            </a:r>
+          </a:p>
+          <a:p>
+            <a:pPr lvl="1" fontAlgn="auto">
+              <a:spcAft>
+                <a:spcPts val="0"/>
+              </a:spcAft>
+              <a:buClr>
+                <a:schemeClr val="accent1">
+                  <a:lumMod val="75000"/>
+                </a:schemeClr>
+              </a:buClr>
+              <a:buFont typeface="Arial"/>
+              <a:buChar char="•"/>
+              <a:defRPr/>
+            </a:pPr>
+            <a:r>
+              <a:rPr lang="en-US" dirty="0"/>
+              <a:t>The milestone was enjoyable to make, it was nice to take a topic we learned in a previous class and expand on it by creating a user story map.</a:t>
+            </a:r>
+          </a:p>
+          <a:p>
+            <a:pPr fontAlgn="auto">
+              <a:spcAft>
+                <a:spcPts val="0"/>
+              </a:spcAft>
+              <a:buClr>
+                <a:schemeClr val="accent1">
+                  <a:lumMod val="75000"/>
+                </a:schemeClr>
+              </a:buClr>
+              <a:buFont typeface="Arial"/>
+              <a:buChar char="•"/>
+              <a:defRPr/>
+            </a:pPr>
+            <a:r>
+              <a:rPr lang="en-US" dirty="0"/>
+              <a:t>What did you learn about yourself as you collaborated and worked through this milestone?</a:t>
+            </a:r>
+          </a:p>
+          <a:p>
+            <a:pPr lvl="1" fontAlgn="auto">
+              <a:spcAft>
+                <a:spcPts val="0"/>
+              </a:spcAft>
+              <a:buClr>
+                <a:schemeClr val="accent1">
+                  <a:lumMod val="75000"/>
+                </a:schemeClr>
+              </a:buClr>
+              <a:buFont typeface="Arial"/>
+              <a:buChar char="•"/>
+              <a:defRPr/>
+            </a:pPr>
+            <a:r>
+              <a:rPr lang="en-US" dirty="0"/>
+              <a:t>We each had our own version of how the USM would look and it was interesting to collaborate our ideas into the design we showed today.</a:t>
+            </a:r>
+          </a:p>
+          <a:p>
+            <a:pPr fontAlgn="auto">
+              <a:spcAft>
+                <a:spcPts val="0"/>
+              </a:spcAft>
+              <a:buClr>
+                <a:schemeClr val="accent1">
+                  <a:lumMod val="75000"/>
+                </a:schemeClr>
+              </a:buClr>
+              <a:buFont typeface="Arial"/>
+              <a:buChar char="•"/>
+              <a:defRPr/>
+            </a:pPr>
+            <a:r>
+              <a:rPr lang="en-US" dirty="0"/>
+              <a:t>How will you use what you have learned going forward?</a:t>
+            </a:r>
+          </a:p>
+          <a:p>
+            <a:pPr lvl="1" fontAlgn="auto">
+              <a:spcAft>
+                <a:spcPts val="0"/>
+              </a:spcAft>
+              <a:buClr>
+                <a:schemeClr val="accent1">
+                  <a:lumMod val="75000"/>
+                </a:schemeClr>
+              </a:buClr>
+              <a:buFont typeface="Arial"/>
+              <a:buChar char="•"/>
+              <a:defRPr/>
+            </a:pPr>
+            <a:r>
+              <a:rPr lang="en-US" dirty="0"/>
+              <a:t>The user story map really breaks down what we will need to code and how the structure of the program will look</a:t>
+            </a:r>
+          </a:p>
+          <a:p>
+            <a:pPr fontAlgn="auto">
+              <a:spcAft>
+                <a:spcPts val="0"/>
+              </a:spcAft>
+              <a:buClr>
+                <a:schemeClr val="accent1">
+                  <a:lumMod val="75000"/>
+                </a:schemeClr>
+              </a:buClr>
+              <a:buFont typeface="Arial"/>
+              <a:buChar char="•"/>
+              <a:defRPr/>
+            </a:pPr>
+            <a:r>
+              <a:rPr lang="en-US" dirty="0"/>
+              <a:t>What “stuff &amp; things” related to this milestone would you want help with?</a:t>
+            </a:r>
+          </a:p>
+          <a:p>
+            <a:pPr lvl="1" fontAlgn="auto">
+              <a:spcAft>
+                <a:spcPts val="0"/>
+              </a:spcAft>
+              <a:buClr>
+                <a:schemeClr val="accent1">
+                  <a:lumMod val="75000"/>
+                </a:schemeClr>
+              </a:buClr>
+              <a:buFont typeface="Arial"/>
+              <a:buChar char="•"/>
+              <a:defRPr/>
+            </a:pPr>
+            <a:r>
+              <a:rPr lang="en-US" dirty="0"/>
+              <a:t>The User Story Map was the first thing of real depth we needed to accomplish and it was enjoyable to plan it out in our own way and create it.</a:t>
+            </a:r>
+            <a:endParaRPr lang="en-CA" dirty="0"/>
+          </a:p>
+        </p:txBody>
+      </p:sp>
+    </p:spTree>
+  </p:cSld>
+  <p:clrMapOvr>
+    <a:masterClrMapping/>
+  </p:clrMapOvr>
+</p:sld>
+</file>
+
 <file path=ppt/slides/slide2.xml><?xml version="1.0" encoding="utf-8"?>
 <p:sld xmlns:a="http://schemas.openxmlformats.org/drawingml/2006/main" xmlns:r="http://schemas.openxmlformats.org/officeDocument/2006/relationships" xmlns:p="http://schemas.openxmlformats.org/presentationml/2006/main">
   <p:cSld>
@@ -7053,6 +7298,1506 @@
       </p:grpSpPr>
       <p:sp>
         <p:nvSpPr>
+          <p:cNvPr id="2" name="Title 1"/>
+          <p:cNvSpPr>
+            <a:spLocks noGrp="1"/>
+          </p:cNvSpPr>
+          <p:nvPr>
+            <p:ph type="title"/>
+          </p:nvPr>
+        </p:nvSpPr>
+        <p:spPr>
+          <a:xfrm>
+            <a:off x="1587731" y="0"/>
+            <a:ext cx="10604268" cy="1314450"/>
+          </a:xfrm>
+        </p:spPr>
+        <p:txBody>
+          <a:bodyPr/>
+          <a:lstStyle/>
+          <a:p>
+            <a:r>
+              <a:rPr lang="en-US" dirty="0" smtClean="0"/>
+              <a:t>As a User I would like to…</a:t>
+            </a:r>
+            <a:endParaRPr lang="en-US" dirty="0"/>
+          </a:p>
+        </p:txBody>
+      </p:sp>
+      <p:sp>
+        <p:nvSpPr>
+          <p:cNvPr id="6" name="Rectangle 5"/>
+          <p:cNvSpPr/>
+          <p:nvPr/>
+        </p:nvSpPr>
+        <p:spPr>
+          <a:xfrm>
+            <a:off x="5271408" y="1842402"/>
+            <a:ext cx="2539438" cy="1632857"/>
+          </a:xfrm>
+          <a:prstGeom prst="rect">
+            <a:avLst/>
+          </a:prstGeom>
+          <a:solidFill>
+            <a:schemeClr val="accent4"/>
+          </a:solidFill>
+          <a:ln>
+            <a:solidFill>
+              <a:srgbClr val="FF0000"/>
+            </a:solidFill>
+          </a:ln>
+        </p:spPr>
+        <p:style>
+          <a:lnRef idx="2">
+            <a:schemeClr val="accent1">
+              <a:shade val="50000"/>
+            </a:schemeClr>
+          </a:lnRef>
+          <a:fillRef idx="1">
+            <a:schemeClr val="accent1"/>
+          </a:fillRef>
+          <a:effectRef idx="0">
+            <a:schemeClr val="accent1"/>
+          </a:effectRef>
+          <a:fontRef idx="minor">
+            <a:schemeClr val="lt1"/>
+          </a:fontRef>
+        </p:style>
+        <p:txBody>
+          <a:bodyPr rtlCol="0" anchor="ctr"/>
+          <a:lstStyle/>
+          <a:p>
+            <a:pPr algn="ctr"/>
+            <a:endParaRPr lang="en-US" dirty="0"/>
+          </a:p>
+        </p:txBody>
+      </p:sp>
+      <p:sp>
+        <p:nvSpPr>
+          <p:cNvPr id="12" name="Rectangle 11"/>
+          <p:cNvSpPr/>
+          <p:nvPr/>
+        </p:nvSpPr>
+        <p:spPr>
+          <a:xfrm>
+            <a:off x="2158093" y="1842403"/>
+            <a:ext cx="2539438" cy="1632857"/>
+          </a:xfrm>
+          <a:prstGeom prst="rect">
+            <a:avLst/>
+          </a:prstGeom>
+          <a:solidFill>
+            <a:schemeClr val="accent4"/>
+          </a:solidFill>
+          <a:ln>
+            <a:solidFill>
+              <a:srgbClr val="FF0000"/>
+            </a:solidFill>
+          </a:ln>
+        </p:spPr>
+        <p:style>
+          <a:lnRef idx="2">
+            <a:schemeClr val="accent1">
+              <a:shade val="50000"/>
+            </a:schemeClr>
+          </a:lnRef>
+          <a:fillRef idx="1">
+            <a:schemeClr val="accent1"/>
+          </a:fillRef>
+          <a:effectRef idx="0">
+            <a:schemeClr val="accent1"/>
+          </a:effectRef>
+          <a:fontRef idx="minor">
+            <a:schemeClr val="lt1"/>
+          </a:fontRef>
+        </p:style>
+        <p:txBody>
+          <a:bodyPr rtlCol="0" anchor="ctr"/>
+          <a:lstStyle/>
+          <a:p>
+            <a:pPr algn="ctr"/>
+            <a:endParaRPr lang="en-US" dirty="0"/>
+          </a:p>
+        </p:txBody>
+      </p:sp>
+      <p:sp>
+        <p:nvSpPr>
+          <p:cNvPr id="13" name="Rectangle 12"/>
+          <p:cNvSpPr/>
+          <p:nvPr/>
+        </p:nvSpPr>
+        <p:spPr>
+          <a:xfrm>
+            <a:off x="8510202" y="1842404"/>
+            <a:ext cx="2539438" cy="1632857"/>
+          </a:xfrm>
+          <a:prstGeom prst="rect">
+            <a:avLst/>
+          </a:prstGeom>
+          <a:solidFill>
+            <a:schemeClr val="accent4"/>
+          </a:solidFill>
+          <a:ln>
+            <a:solidFill>
+              <a:srgbClr val="FF0000"/>
+            </a:solidFill>
+          </a:ln>
+        </p:spPr>
+        <p:style>
+          <a:lnRef idx="2">
+            <a:schemeClr val="accent1">
+              <a:shade val="50000"/>
+            </a:schemeClr>
+          </a:lnRef>
+          <a:fillRef idx="1">
+            <a:schemeClr val="accent1"/>
+          </a:fillRef>
+          <a:effectRef idx="0">
+            <a:schemeClr val="accent1"/>
+          </a:effectRef>
+          <a:fontRef idx="minor">
+            <a:schemeClr val="lt1"/>
+          </a:fontRef>
+        </p:style>
+        <p:txBody>
+          <a:bodyPr rtlCol="0" anchor="ctr"/>
+          <a:lstStyle/>
+          <a:p>
+            <a:pPr algn="ctr"/>
+            <a:endParaRPr lang="en-US" dirty="0"/>
+          </a:p>
+        </p:txBody>
+      </p:sp>
+      <p:sp>
+        <p:nvSpPr>
+          <p:cNvPr id="14" name="Rectangle 13"/>
+          <p:cNvSpPr/>
+          <p:nvPr/>
+        </p:nvSpPr>
+        <p:spPr>
+          <a:xfrm>
+            <a:off x="2220685" y="3995053"/>
+            <a:ext cx="2539438" cy="1632857"/>
+          </a:xfrm>
+          <a:prstGeom prst="rect">
+            <a:avLst/>
+          </a:prstGeom>
+          <a:solidFill>
+            <a:schemeClr val="accent4"/>
+          </a:solidFill>
+          <a:ln>
+            <a:solidFill>
+              <a:srgbClr val="FF0000"/>
+            </a:solidFill>
+          </a:ln>
+        </p:spPr>
+        <p:style>
+          <a:lnRef idx="2">
+            <a:schemeClr val="accent1">
+              <a:shade val="50000"/>
+            </a:schemeClr>
+          </a:lnRef>
+          <a:fillRef idx="1">
+            <a:schemeClr val="accent1"/>
+          </a:fillRef>
+          <a:effectRef idx="0">
+            <a:schemeClr val="accent1"/>
+          </a:effectRef>
+          <a:fontRef idx="minor">
+            <a:schemeClr val="lt1"/>
+          </a:fontRef>
+        </p:style>
+        <p:txBody>
+          <a:bodyPr rtlCol="0" anchor="ctr"/>
+          <a:lstStyle/>
+          <a:p>
+            <a:pPr algn="ctr"/>
+            <a:endParaRPr lang="en-US" dirty="0"/>
+          </a:p>
+        </p:txBody>
+      </p:sp>
+      <p:sp>
+        <p:nvSpPr>
+          <p:cNvPr id="15" name="Rectangle 14"/>
+          <p:cNvSpPr/>
+          <p:nvPr/>
+        </p:nvSpPr>
+        <p:spPr>
+          <a:xfrm>
+            <a:off x="5271408" y="3995052"/>
+            <a:ext cx="2539438" cy="1632857"/>
+          </a:xfrm>
+          <a:prstGeom prst="rect">
+            <a:avLst/>
+          </a:prstGeom>
+          <a:solidFill>
+            <a:schemeClr val="accent4"/>
+          </a:solidFill>
+          <a:ln>
+            <a:solidFill>
+              <a:srgbClr val="FF0000"/>
+            </a:solidFill>
+          </a:ln>
+        </p:spPr>
+        <p:style>
+          <a:lnRef idx="2">
+            <a:schemeClr val="accent1">
+              <a:shade val="50000"/>
+            </a:schemeClr>
+          </a:lnRef>
+          <a:fillRef idx="1">
+            <a:schemeClr val="accent1"/>
+          </a:fillRef>
+          <a:effectRef idx="0">
+            <a:schemeClr val="accent1"/>
+          </a:effectRef>
+          <a:fontRef idx="minor">
+            <a:schemeClr val="lt1"/>
+          </a:fontRef>
+        </p:style>
+        <p:txBody>
+          <a:bodyPr rtlCol="0" anchor="ctr"/>
+          <a:lstStyle/>
+          <a:p>
+            <a:pPr algn="ctr"/>
+            <a:endParaRPr lang="en-US" dirty="0"/>
+          </a:p>
+        </p:txBody>
+      </p:sp>
+      <p:sp>
+        <p:nvSpPr>
+          <p:cNvPr id="16" name="Rectangle 15"/>
+          <p:cNvSpPr/>
+          <p:nvPr/>
+        </p:nvSpPr>
+        <p:spPr>
+          <a:xfrm>
+            <a:off x="8472398" y="3995051"/>
+            <a:ext cx="2539438" cy="1632857"/>
+          </a:xfrm>
+          <a:prstGeom prst="rect">
+            <a:avLst/>
+          </a:prstGeom>
+          <a:solidFill>
+            <a:schemeClr val="accent4"/>
+          </a:solidFill>
+          <a:ln>
+            <a:solidFill>
+              <a:srgbClr val="FF0000"/>
+            </a:solidFill>
+          </a:ln>
+        </p:spPr>
+        <p:style>
+          <a:lnRef idx="2">
+            <a:schemeClr val="accent1">
+              <a:shade val="50000"/>
+            </a:schemeClr>
+          </a:lnRef>
+          <a:fillRef idx="1">
+            <a:schemeClr val="accent1"/>
+          </a:fillRef>
+          <a:effectRef idx="0">
+            <a:schemeClr val="accent1"/>
+          </a:effectRef>
+          <a:fontRef idx="minor">
+            <a:schemeClr val="lt1"/>
+          </a:fontRef>
+        </p:style>
+        <p:txBody>
+          <a:bodyPr rtlCol="0" anchor="ctr"/>
+          <a:lstStyle/>
+          <a:p>
+            <a:pPr algn="ctr"/>
+            <a:endParaRPr lang="en-US" dirty="0"/>
+          </a:p>
+        </p:txBody>
+      </p:sp>
+    </p:spTree>
+    <p:extLst>
+      <p:ext uri="{BB962C8B-B14F-4D97-AF65-F5344CB8AC3E}">
+        <p14:creationId xmlns:p14="http://schemas.microsoft.com/office/powerpoint/2010/main" val="2270437317"/>
+      </p:ext>
+    </p:extLst>
+  </p:cSld>
+  <p:clrMapOvr>
+    <a:masterClrMapping/>
+  </p:clrMapOvr>
+</p:sld>
+</file>
+
+<file path=ppt/slides/slide4.xml><?xml version="1.0" encoding="utf-8"?>
+<p:sld xmlns:a="http://schemas.openxmlformats.org/drawingml/2006/main" xmlns:r="http://schemas.openxmlformats.org/officeDocument/2006/relationships" xmlns:p="http://schemas.openxmlformats.org/presentationml/2006/main">
+  <p:cSld>
+    <p:spTree>
+      <p:nvGrpSpPr>
+        <p:cNvPr id="1" name=""/>
+        <p:cNvGrpSpPr/>
+        <p:nvPr/>
+      </p:nvGrpSpPr>
+      <p:grpSpPr>
+        <a:xfrm>
+          <a:off x="0" y="0"/>
+          <a:ext cx="0" cy="0"/>
+          <a:chOff x="0" y="0"/>
+          <a:chExt cx="0" cy="0"/>
+        </a:xfrm>
+      </p:grpSpPr>
+      <p:sp>
+        <p:nvSpPr>
+          <p:cNvPr id="2" name="Title 1"/>
+          <p:cNvSpPr>
+            <a:spLocks noGrp="1"/>
+          </p:cNvSpPr>
+          <p:nvPr>
+            <p:ph type="title"/>
+          </p:nvPr>
+        </p:nvSpPr>
+        <p:spPr/>
+        <p:txBody>
+          <a:bodyPr/>
+          <a:lstStyle/>
+          <a:p>
+            <a:endParaRPr lang="en-US"/>
+          </a:p>
+        </p:txBody>
+      </p:sp>
+      <p:sp>
+        <p:nvSpPr>
+          <p:cNvPr id="3" name="Content Placeholder 2"/>
+          <p:cNvSpPr>
+            <a:spLocks noGrp="1"/>
+          </p:cNvSpPr>
+          <p:nvPr>
+            <p:ph idx="1"/>
+          </p:nvPr>
+        </p:nvSpPr>
+        <p:spPr/>
+        <p:txBody>
+          <a:bodyPr/>
+          <a:lstStyle/>
+          <a:p>
+            <a:endParaRPr lang="en-US"/>
+          </a:p>
+        </p:txBody>
+      </p:sp>
+    </p:spTree>
+    <p:extLst>
+      <p:ext uri="{BB962C8B-B14F-4D97-AF65-F5344CB8AC3E}">
+        <p14:creationId xmlns:p14="http://schemas.microsoft.com/office/powerpoint/2010/main" val="519132367"/>
+      </p:ext>
+    </p:extLst>
+  </p:cSld>
+  <p:clrMapOvr>
+    <a:masterClrMapping/>
+  </p:clrMapOvr>
+</p:sld>
+</file>
+
+<file path=ppt/slides/slide5.xml><?xml version="1.0" encoding="utf-8"?>
+<p:sld xmlns:a="http://schemas.openxmlformats.org/drawingml/2006/main" xmlns:r="http://schemas.openxmlformats.org/officeDocument/2006/relationships" xmlns:p="http://schemas.openxmlformats.org/presentationml/2006/main">
+  <p:cSld>
+    <p:spTree>
+      <p:nvGrpSpPr>
+        <p:cNvPr id="1" name=""/>
+        <p:cNvGrpSpPr/>
+        <p:nvPr/>
+      </p:nvGrpSpPr>
+      <p:grpSpPr>
+        <a:xfrm>
+          <a:off x="0" y="0"/>
+          <a:ext cx="0" cy="0"/>
+          <a:chOff x="0" y="0"/>
+          <a:chExt cx="0" cy="0"/>
+        </a:xfrm>
+      </p:grpSpPr>
+      <p:sp>
+        <p:nvSpPr>
+          <p:cNvPr id="2" name="Title 1"/>
+          <p:cNvSpPr>
+            <a:spLocks noGrp="1"/>
+          </p:cNvSpPr>
+          <p:nvPr>
+            <p:ph type="title"/>
+          </p:nvPr>
+        </p:nvSpPr>
+        <p:spPr>
+          <a:xfrm>
+            <a:off x="1587731" y="0"/>
+            <a:ext cx="10604268" cy="1314450"/>
+          </a:xfrm>
+        </p:spPr>
+        <p:txBody>
+          <a:bodyPr/>
+          <a:lstStyle/>
+          <a:p>
+            <a:r>
+              <a:rPr lang="en-US" dirty="0" smtClean="0"/>
+              <a:t>As a Software Approver I would like to…</a:t>
+            </a:r>
+            <a:endParaRPr lang="en-US" dirty="0"/>
+          </a:p>
+        </p:txBody>
+      </p:sp>
+      <p:sp>
+        <p:nvSpPr>
+          <p:cNvPr id="6" name="Rectangle 5"/>
+          <p:cNvSpPr/>
+          <p:nvPr/>
+        </p:nvSpPr>
+        <p:spPr>
+          <a:xfrm>
+            <a:off x="5271408" y="1156626"/>
+            <a:ext cx="2539438" cy="1632857"/>
+          </a:xfrm>
+          <a:prstGeom prst="rect">
+            <a:avLst/>
+          </a:prstGeom>
+          <a:solidFill>
+            <a:srgbClr val="92D050"/>
+          </a:solidFill>
+          <a:ln>
+            <a:solidFill>
+              <a:schemeClr val="accent2"/>
+            </a:solidFill>
+          </a:ln>
+        </p:spPr>
+        <p:style>
+          <a:lnRef idx="2">
+            <a:schemeClr val="accent1">
+              <a:shade val="50000"/>
+            </a:schemeClr>
+          </a:lnRef>
+          <a:fillRef idx="1">
+            <a:schemeClr val="accent1"/>
+          </a:fillRef>
+          <a:effectRef idx="0">
+            <a:schemeClr val="accent1"/>
+          </a:effectRef>
+          <a:fontRef idx="minor">
+            <a:schemeClr val="lt1"/>
+          </a:fontRef>
+        </p:style>
+        <p:txBody>
+          <a:bodyPr rtlCol="0" anchor="ctr"/>
+          <a:lstStyle/>
+          <a:p>
+            <a:pPr algn="ctr"/>
+            <a:r>
+              <a:rPr lang="en-US" dirty="0" smtClean="0"/>
+              <a:t>…be able to request additional information from the user to avoid denying requests that lack information.</a:t>
+            </a:r>
+            <a:endParaRPr lang="en-US" dirty="0"/>
+          </a:p>
+        </p:txBody>
+      </p:sp>
+      <p:sp>
+        <p:nvSpPr>
+          <p:cNvPr id="12" name="Rectangle 11"/>
+          <p:cNvSpPr/>
+          <p:nvPr/>
+        </p:nvSpPr>
+        <p:spPr>
+          <a:xfrm>
+            <a:off x="2158093" y="1156627"/>
+            <a:ext cx="2539438" cy="1632857"/>
+          </a:xfrm>
+          <a:prstGeom prst="rect">
+            <a:avLst/>
+          </a:prstGeom>
+          <a:solidFill>
+            <a:srgbClr val="92D050"/>
+          </a:solidFill>
+          <a:ln>
+            <a:solidFill>
+              <a:schemeClr val="accent2"/>
+            </a:solidFill>
+          </a:ln>
+        </p:spPr>
+        <p:style>
+          <a:lnRef idx="2">
+            <a:schemeClr val="accent1">
+              <a:shade val="50000"/>
+            </a:schemeClr>
+          </a:lnRef>
+          <a:fillRef idx="1">
+            <a:schemeClr val="accent1"/>
+          </a:fillRef>
+          <a:effectRef idx="0">
+            <a:schemeClr val="accent1"/>
+          </a:effectRef>
+          <a:fontRef idx="minor">
+            <a:schemeClr val="lt1"/>
+          </a:fontRef>
+        </p:style>
+        <p:txBody>
+          <a:bodyPr rtlCol="0" anchor="ctr"/>
+          <a:lstStyle/>
+          <a:p>
+            <a:pPr algn="ctr"/>
+            <a:r>
+              <a:rPr lang="en-US" dirty="0" smtClean="0"/>
+              <a:t>…only </a:t>
+            </a:r>
+            <a:r>
+              <a:rPr lang="en-US" dirty="0"/>
+              <a:t>handle electronic submissions </a:t>
+            </a:r>
+            <a:r>
+              <a:rPr lang="en-US" dirty="0" smtClean="0"/>
+              <a:t>to eliminate paperwork and streamline the process.</a:t>
+            </a:r>
+            <a:endParaRPr lang="en-US" dirty="0"/>
+          </a:p>
+          <a:p>
+            <a:pPr algn="ctr"/>
+            <a:endParaRPr lang="en-US" dirty="0"/>
+          </a:p>
+        </p:txBody>
+      </p:sp>
+      <p:sp>
+        <p:nvSpPr>
+          <p:cNvPr id="13" name="Rectangle 12"/>
+          <p:cNvSpPr/>
+          <p:nvPr/>
+        </p:nvSpPr>
+        <p:spPr>
+          <a:xfrm>
+            <a:off x="8510202" y="1156628"/>
+            <a:ext cx="2539438" cy="1632857"/>
+          </a:xfrm>
+          <a:prstGeom prst="rect">
+            <a:avLst/>
+          </a:prstGeom>
+          <a:solidFill>
+            <a:srgbClr val="92D050"/>
+          </a:solidFill>
+          <a:ln>
+            <a:solidFill>
+              <a:schemeClr val="accent2"/>
+            </a:solidFill>
+          </a:ln>
+        </p:spPr>
+        <p:style>
+          <a:lnRef idx="2">
+            <a:schemeClr val="accent1">
+              <a:shade val="50000"/>
+            </a:schemeClr>
+          </a:lnRef>
+          <a:fillRef idx="1">
+            <a:schemeClr val="accent1"/>
+          </a:fillRef>
+          <a:effectRef idx="0">
+            <a:schemeClr val="accent1"/>
+          </a:effectRef>
+          <a:fontRef idx="minor">
+            <a:schemeClr val="lt1"/>
+          </a:fontRef>
+        </p:style>
+        <p:txBody>
+          <a:bodyPr rtlCol="0" anchor="ctr"/>
+          <a:lstStyle/>
+          <a:p>
+            <a:pPr algn="ctr"/>
+            <a:r>
+              <a:rPr lang="en-US" dirty="0" smtClean="0"/>
+              <a:t>…have all the user’s information available in order to accurately approve or deny tickets.</a:t>
+            </a:r>
+            <a:endParaRPr lang="en-US" dirty="0"/>
+          </a:p>
+        </p:txBody>
+      </p:sp>
+      <p:sp>
+        <p:nvSpPr>
+          <p:cNvPr id="14" name="Rectangle 13"/>
+          <p:cNvSpPr/>
+          <p:nvPr/>
+        </p:nvSpPr>
+        <p:spPr>
+          <a:xfrm>
+            <a:off x="2220685" y="2941897"/>
+            <a:ext cx="2539438" cy="1632857"/>
+          </a:xfrm>
+          <a:prstGeom prst="rect">
+            <a:avLst/>
+          </a:prstGeom>
+          <a:solidFill>
+            <a:srgbClr val="92D050"/>
+          </a:solidFill>
+          <a:ln>
+            <a:solidFill>
+              <a:schemeClr val="accent2"/>
+            </a:solidFill>
+          </a:ln>
+        </p:spPr>
+        <p:style>
+          <a:lnRef idx="2">
+            <a:schemeClr val="accent1">
+              <a:shade val="50000"/>
+            </a:schemeClr>
+          </a:lnRef>
+          <a:fillRef idx="1">
+            <a:schemeClr val="accent1"/>
+          </a:fillRef>
+          <a:effectRef idx="0">
+            <a:schemeClr val="accent1"/>
+          </a:effectRef>
+          <a:fontRef idx="minor">
+            <a:schemeClr val="lt1"/>
+          </a:fontRef>
+        </p:style>
+        <p:txBody>
+          <a:bodyPr rtlCol="0" anchor="ctr"/>
+          <a:lstStyle/>
+          <a:p>
+            <a:pPr algn="ctr"/>
+            <a:r>
+              <a:rPr lang="en-US" dirty="0" smtClean="0"/>
+              <a:t>…not </a:t>
+            </a:r>
+            <a:r>
+              <a:rPr lang="en-US" dirty="0"/>
+              <a:t>have to physically sign software approvals in order to avoid clutter and save time.</a:t>
+            </a:r>
+          </a:p>
+        </p:txBody>
+      </p:sp>
+      <p:sp>
+        <p:nvSpPr>
+          <p:cNvPr id="15" name="Rectangle 14"/>
+          <p:cNvSpPr/>
+          <p:nvPr/>
+        </p:nvSpPr>
+        <p:spPr>
+          <a:xfrm>
+            <a:off x="5271408" y="2941896"/>
+            <a:ext cx="2539438" cy="1632857"/>
+          </a:xfrm>
+          <a:prstGeom prst="rect">
+            <a:avLst/>
+          </a:prstGeom>
+          <a:solidFill>
+            <a:srgbClr val="92D050"/>
+          </a:solidFill>
+          <a:ln>
+            <a:solidFill>
+              <a:schemeClr val="accent2"/>
+            </a:solidFill>
+          </a:ln>
+        </p:spPr>
+        <p:style>
+          <a:lnRef idx="2">
+            <a:schemeClr val="accent1">
+              <a:shade val="50000"/>
+            </a:schemeClr>
+          </a:lnRef>
+          <a:fillRef idx="1">
+            <a:schemeClr val="accent1"/>
+          </a:fillRef>
+          <a:effectRef idx="0">
+            <a:schemeClr val="accent1"/>
+          </a:effectRef>
+          <a:fontRef idx="minor">
+            <a:schemeClr val="lt1"/>
+          </a:fontRef>
+        </p:style>
+        <p:txBody>
+          <a:bodyPr rtlCol="0" anchor="ctr"/>
+          <a:lstStyle/>
+          <a:p>
+            <a:pPr algn="ctr"/>
+            <a:r>
+              <a:rPr lang="en-US" dirty="0" smtClean="0"/>
+              <a:t>…be able to forward an application request to a superior to avoid redundant communication.</a:t>
+            </a:r>
+            <a:endParaRPr lang="en-US" dirty="0"/>
+          </a:p>
+        </p:txBody>
+      </p:sp>
+      <p:sp>
+        <p:nvSpPr>
+          <p:cNvPr id="16" name="Rectangle 15"/>
+          <p:cNvSpPr/>
+          <p:nvPr/>
+        </p:nvSpPr>
+        <p:spPr>
+          <a:xfrm>
+            <a:off x="8472398" y="2941895"/>
+            <a:ext cx="2539438" cy="1632857"/>
+          </a:xfrm>
+          <a:prstGeom prst="rect">
+            <a:avLst/>
+          </a:prstGeom>
+          <a:solidFill>
+            <a:srgbClr val="92D050"/>
+          </a:solidFill>
+          <a:ln>
+            <a:solidFill>
+              <a:schemeClr val="accent2"/>
+            </a:solidFill>
+          </a:ln>
+        </p:spPr>
+        <p:style>
+          <a:lnRef idx="2">
+            <a:schemeClr val="accent1">
+              <a:shade val="50000"/>
+            </a:schemeClr>
+          </a:lnRef>
+          <a:fillRef idx="1">
+            <a:schemeClr val="accent1"/>
+          </a:fillRef>
+          <a:effectRef idx="0">
+            <a:schemeClr val="accent1"/>
+          </a:effectRef>
+          <a:fontRef idx="minor">
+            <a:schemeClr val="lt1"/>
+          </a:fontRef>
+        </p:style>
+        <p:txBody>
+          <a:bodyPr rtlCol="0" anchor="ctr"/>
+          <a:lstStyle/>
+          <a:p>
+            <a:pPr algn="ctr"/>
+            <a:r>
+              <a:rPr lang="en-US" dirty="0" smtClean="0"/>
+              <a:t>…view previous application requests to maintain a history of application access.</a:t>
+            </a:r>
+            <a:endParaRPr lang="en-US" dirty="0"/>
+          </a:p>
+        </p:txBody>
+      </p:sp>
+      <p:sp>
+        <p:nvSpPr>
+          <p:cNvPr id="17" name="Rectangle 16"/>
+          <p:cNvSpPr/>
+          <p:nvPr/>
+        </p:nvSpPr>
+        <p:spPr>
+          <a:xfrm>
+            <a:off x="2220685" y="4727156"/>
+            <a:ext cx="2539438" cy="1632857"/>
+          </a:xfrm>
+          <a:prstGeom prst="rect">
+            <a:avLst/>
+          </a:prstGeom>
+          <a:solidFill>
+            <a:srgbClr val="92D050"/>
+          </a:solidFill>
+          <a:ln>
+            <a:solidFill>
+              <a:schemeClr val="accent2"/>
+            </a:solidFill>
+          </a:ln>
+        </p:spPr>
+        <p:style>
+          <a:lnRef idx="2">
+            <a:schemeClr val="accent1">
+              <a:shade val="50000"/>
+            </a:schemeClr>
+          </a:lnRef>
+          <a:fillRef idx="1">
+            <a:schemeClr val="accent1"/>
+          </a:fillRef>
+          <a:effectRef idx="0">
+            <a:schemeClr val="accent1"/>
+          </a:effectRef>
+          <a:fontRef idx="minor">
+            <a:schemeClr val="lt1"/>
+          </a:fontRef>
+        </p:style>
+        <p:txBody>
+          <a:bodyPr rtlCol="0" anchor="ctr"/>
+          <a:lstStyle/>
+          <a:p>
+            <a:pPr algn="ctr"/>
+            <a:r>
+              <a:rPr lang="en-US" dirty="0" smtClean="0"/>
+              <a:t>…be notified by email when I am required to approve a ticket to avoid ignoring tickets.</a:t>
+            </a:r>
+            <a:endParaRPr lang="en-US" dirty="0"/>
+          </a:p>
+        </p:txBody>
+      </p:sp>
+      <p:sp>
+        <p:nvSpPr>
+          <p:cNvPr id="18" name="Rectangle 17"/>
+          <p:cNvSpPr/>
+          <p:nvPr/>
+        </p:nvSpPr>
+        <p:spPr>
+          <a:xfrm>
+            <a:off x="5271408" y="4727155"/>
+            <a:ext cx="2539438" cy="1632857"/>
+          </a:xfrm>
+          <a:prstGeom prst="rect">
+            <a:avLst/>
+          </a:prstGeom>
+          <a:solidFill>
+            <a:srgbClr val="92D050"/>
+          </a:solidFill>
+          <a:ln>
+            <a:solidFill>
+              <a:schemeClr val="accent2"/>
+            </a:solidFill>
+          </a:ln>
+        </p:spPr>
+        <p:style>
+          <a:lnRef idx="2">
+            <a:schemeClr val="accent1">
+              <a:shade val="50000"/>
+            </a:schemeClr>
+          </a:lnRef>
+          <a:fillRef idx="1">
+            <a:schemeClr val="accent1"/>
+          </a:fillRef>
+          <a:effectRef idx="0">
+            <a:schemeClr val="accent1"/>
+          </a:effectRef>
+          <a:fontRef idx="minor">
+            <a:schemeClr val="lt1"/>
+          </a:fontRef>
+        </p:style>
+        <p:txBody>
+          <a:bodyPr rtlCol="0" anchor="ctr"/>
+          <a:lstStyle/>
+          <a:p>
+            <a:pPr algn="ctr"/>
+            <a:r>
+              <a:rPr lang="en-US" dirty="0" smtClean="0"/>
+              <a:t>…approve or deny a user access to a software to perform my duty as a software approver.</a:t>
+            </a:r>
+            <a:endParaRPr lang="en-US" dirty="0"/>
+          </a:p>
+        </p:txBody>
+      </p:sp>
+      <p:sp>
+        <p:nvSpPr>
+          <p:cNvPr id="19" name="Rectangle 18"/>
+          <p:cNvSpPr/>
+          <p:nvPr/>
+        </p:nvSpPr>
+        <p:spPr>
+          <a:xfrm>
+            <a:off x="8472398" y="4727154"/>
+            <a:ext cx="2539438" cy="1632857"/>
+          </a:xfrm>
+          <a:prstGeom prst="rect">
+            <a:avLst/>
+          </a:prstGeom>
+          <a:solidFill>
+            <a:srgbClr val="92D050"/>
+          </a:solidFill>
+          <a:ln>
+            <a:solidFill>
+              <a:schemeClr val="accent2"/>
+            </a:solidFill>
+          </a:ln>
+        </p:spPr>
+        <p:style>
+          <a:lnRef idx="2">
+            <a:schemeClr val="accent1">
+              <a:shade val="50000"/>
+            </a:schemeClr>
+          </a:lnRef>
+          <a:fillRef idx="1">
+            <a:schemeClr val="accent1"/>
+          </a:fillRef>
+          <a:effectRef idx="0">
+            <a:schemeClr val="accent1"/>
+          </a:effectRef>
+          <a:fontRef idx="minor">
+            <a:schemeClr val="lt1"/>
+          </a:fontRef>
+        </p:style>
+        <p:txBody>
+          <a:bodyPr rtlCol="0" anchor="ctr"/>
+          <a:lstStyle/>
+          <a:p>
+            <a:pPr algn="ctr"/>
+            <a:r>
+              <a:rPr lang="en-US" dirty="0" smtClean="0"/>
+              <a:t>…easily search and filter submissions to make finding specific tickets easier.</a:t>
+            </a:r>
+            <a:endParaRPr lang="en-US" dirty="0"/>
+          </a:p>
+        </p:txBody>
+      </p:sp>
+    </p:spTree>
+    <p:extLst>
+      <p:ext uri="{BB962C8B-B14F-4D97-AF65-F5344CB8AC3E}">
+        <p14:creationId xmlns:p14="http://schemas.microsoft.com/office/powerpoint/2010/main" val="814092023"/>
+      </p:ext>
+    </p:extLst>
+  </p:cSld>
+  <p:clrMapOvr>
+    <a:masterClrMapping/>
+  </p:clrMapOvr>
+</p:sld>
+</file>
+
+<file path=ppt/slides/slide6.xml><?xml version="1.0" encoding="utf-8"?>
+<p:sld xmlns:a="http://schemas.openxmlformats.org/drawingml/2006/main" xmlns:r="http://schemas.openxmlformats.org/officeDocument/2006/relationships" xmlns:p="http://schemas.openxmlformats.org/presentationml/2006/main">
+  <p:cSld>
+    <p:spTree>
+      <p:nvGrpSpPr>
+        <p:cNvPr id="1" name=""/>
+        <p:cNvGrpSpPr/>
+        <p:nvPr/>
+      </p:nvGrpSpPr>
+      <p:grpSpPr>
+        <a:xfrm>
+          <a:off x="0" y="0"/>
+          <a:ext cx="0" cy="0"/>
+          <a:chOff x="0" y="0"/>
+          <a:chExt cx="0" cy="0"/>
+        </a:xfrm>
+      </p:grpSpPr>
+      <p:sp>
+        <p:nvSpPr>
+          <p:cNvPr id="2" name="Title 1"/>
+          <p:cNvSpPr>
+            <a:spLocks noGrp="1"/>
+          </p:cNvSpPr>
+          <p:nvPr>
+            <p:ph type="title"/>
+          </p:nvPr>
+        </p:nvSpPr>
+        <p:spPr/>
+        <p:txBody>
+          <a:bodyPr/>
+          <a:lstStyle/>
+          <a:p>
+            <a:endParaRPr lang="en-US"/>
+          </a:p>
+        </p:txBody>
+      </p:sp>
+      <p:sp>
+        <p:nvSpPr>
+          <p:cNvPr id="3" name="Content Placeholder 2"/>
+          <p:cNvSpPr>
+            <a:spLocks noGrp="1"/>
+          </p:cNvSpPr>
+          <p:nvPr>
+            <p:ph idx="1"/>
+          </p:nvPr>
+        </p:nvSpPr>
+        <p:spPr/>
+        <p:txBody>
+          <a:bodyPr/>
+          <a:lstStyle/>
+          <a:p>
+            <a:endParaRPr lang="en-US"/>
+          </a:p>
+        </p:txBody>
+      </p:sp>
+      <p:pic>
+        <p:nvPicPr>
+          <p:cNvPr id="1026" name="Picture 2" descr="C:\Users\Quinn\Downloads\SoftwareApprover.png"/>
+          <p:cNvPicPr>
+            <a:picLocks noChangeAspect="1" noChangeArrowheads="1"/>
+          </p:cNvPicPr>
+          <p:nvPr/>
+        </p:nvPicPr>
+        <p:blipFill>
+          <a:blip r:embed="rId2">
+            <a:extLst>
+              <a:ext uri="{28A0092B-C50C-407E-A947-70E740481C1C}">
+                <a14:useLocalDpi xmlns:a14="http://schemas.microsoft.com/office/drawing/2010/main" val="0"/>
+              </a:ext>
+            </a:extLst>
+          </a:blip>
+          <a:srcRect/>
+          <a:stretch>
+            <a:fillRect/>
+          </a:stretch>
+        </p:blipFill>
+        <p:spPr bwMode="auto">
+          <a:xfrm>
+            <a:off x="3239113" y="0"/>
+            <a:ext cx="8952887" cy="6858000"/>
+          </a:xfrm>
+          <a:prstGeom prst="rect">
+            <a:avLst/>
+          </a:prstGeom>
+          <a:noFill/>
+          <a:extLst>
+            <a:ext uri="{909E8E84-426E-40DD-AFC4-6F175D3DCCD1}">
+              <a14:hiddenFill xmlns:a14="http://schemas.microsoft.com/office/drawing/2010/main">
+                <a:solidFill>
+                  <a:srgbClr val="FFFFFF"/>
+                </a:solidFill>
+              </a14:hiddenFill>
+            </a:ext>
+          </a:extLst>
+        </p:spPr>
+      </p:pic>
+    </p:spTree>
+    <p:extLst>
+      <p:ext uri="{BB962C8B-B14F-4D97-AF65-F5344CB8AC3E}">
+        <p14:creationId xmlns:p14="http://schemas.microsoft.com/office/powerpoint/2010/main" val="4163156666"/>
+      </p:ext>
+    </p:extLst>
+  </p:cSld>
+  <p:clrMapOvr>
+    <a:masterClrMapping/>
+  </p:clrMapOvr>
+</p:sld>
+</file>
+
+<file path=ppt/slides/slide7.xml><?xml version="1.0" encoding="utf-8"?>
+<p:sld xmlns:a="http://schemas.openxmlformats.org/drawingml/2006/main" xmlns:r="http://schemas.openxmlformats.org/officeDocument/2006/relationships" xmlns:p="http://schemas.openxmlformats.org/presentationml/2006/main">
+  <p:cSld>
+    <p:spTree>
+      <p:nvGrpSpPr>
+        <p:cNvPr id="1" name=""/>
+        <p:cNvGrpSpPr/>
+        <p:nvPr/>
+      </p:nvGrpSpPr>
+      <p:grpSpPr>
+        <a:xfrm>
+          <a:off x="0" y="0"/>
+          <a:ext cx="0" cy="0"/>
+          <a:chOff x="0" y="0"/>
+          <a:chExt cx="0" cy="0"/>
+        </a:xfrm>
+      </p:grpSpPr>
+      <p:sp>
+        <p:nvSpPr>
+          <p:cNvPr id="2" name="Title 1"/>
+          <p:cNvSpPr>
+            <a:spLocks noGrp="1"/>
+          </p:cNvSpPr>
+          <p:nvPr>
+            <p:ph type="title"/>
+          </p:nvPr>
+        </p:nvSpPr>
+        <p:spPr>
+          <a:xfrm>
+            <a:off x="1587731" y="0"/>
+            <a:ext cx="10604268" cy="1314450"/>
+          </a:xfrm>
+        </p:spPr>
+        <p:txBody>
+          <a:bodyPr/>
+          <a:lstStyle/>
+          <a:p>
+            <a:r>
+              <a:rPr lang="en-US" dirty="0"/>
+              <a:t>As a member of the HELL IT Staff I would </a:t>
+            </a:r>
+            <a:r>
+              <a:rPr lang="en-US" dirty="0" smtClean="0"/>
+              <a:t>like to…</a:t>
+            </a:r>
+            <a:endParaRPr lang="en-US" dirty="0"/>
+          </a:p>
+        </p:txBody>
+      </p:sp>
+      <p:sp>
+        <p:nvSpPr>
+          <p:cNvPr id="6" name="Rectangle 5"/>
+          <p:cNvSpPr/>
+          <p:nvPr/>
+        </p:nvSpPr>
+        <p:spPr>
+          <a:xfrm>
+            <a:off x="5271408" y="1842402"/>
+            <a:ext cx="2539438" cy="1632857"/>
+          </a:xfrm>
+          <a:prstGeom prst="rect">
+            <a:avLst/>
+          </a:prstGeom>
+          <a:solidFill>
+            <a:schemeClr val="accent1">
+              <a:lumMod val="60000"/>
+              <a:lumOff val="40000"/>
+            </a:schemeClr>
+          </a:solidFill>
+          <a:ln>
+            <a:solidFill>
+              <a:schemeClr val="accent1"/>
+            </a:solidFill>
+          </a:ln>
+        </p:spPr>
+        <p:style>
+          <a:lnRef idx="2">
+            <a:schemeClr val="accent1">
+              <a:shade val="50000"/>
+            </a:schemeClr>
+          </a:lnRef>
+          <a:fillRef idx="1">
+            <a:schemeClr val="accent1"/>
+          </a:fillRef>
+          <a:effectRef idx="0">
+            <a:schemeClr val="accent1"/>
+          </a:effectRef>
+          <a:fontRef idx="minor">
+            <a:schemeClr val="lt1"/>
+          </a:fontRef>
+        </p:style>
+        <p:txBody>
+          <a:bodyPr rtlCol="0" anchor="ctr"/>
+          <a:lstStyle/>
+          <a:p>
+            <a:pPr algn="ctr"/>
+            <a:endParaRPr lang="en-US" dirty="0"/>
+          </a:p>
+        </p:txBody>
+      </p:sp>
+      <p:sp>
+        <p:nvSpPr>
+          <p:cNvPr id="12" name="Rectangle 11"/>
+          <p:cNvSpPr/>
+          <p:nvPr/>
+        </p:nvSpPr>
+        <p:spPr>
+          <a:xfrm>
+            <a:off x="2158093" y="1842403"/>
+            <a:ext cx="2539438" cy="1632857"/>
+          </a:xfrm>
+          <a:prstGeom prst="rect">
+            <a:avLst/>
+          </a:prstGeom>
+          <a:solidFill>
+            <a:schemeClr val="accent1">
+              <a:lumMod val="60000"/>
+              <a:lumOff val="40000"/>
+            </a:schemeClr>
+          </a:solidFill>
+          <a:ln>
+            <a:solidFill>
+              <a:schemeClr val="accent1"/>
+            </a:solidFill>
+          </a:ln>
+        </p:spPr>
+        <p:style>
+          <a:lnRef idx="2">
+            <a:schemeClr val="accent1">
+              <a:shade val="50000"/>
+            </a:schemeClr>
+          </a:lnRef>
+          <a:fillRef idx="1">
+            <a:schemeClr val="accent1"/>
+          </a:fillRef>
+          <a:effectRef idx="0">
+            <a:schemeClr val="accent1"/>
+          </a:effectRef>
+          <a:fontRef idx="minor">
+            <a:schemeClr val="lt1"/>
+          </a:fontRef>
+        </p:style>
+        <p:txBody>
+          <a:bodyPr rtlCol="0" anchor="ctr"/>
+          <a:lstStyle/>
+          <a:p>
+            <a:pPr algn="ctr"/>
+            <a:endParaRPr lang="en-US" dirty="0"/>
+          </a:p>
+        </p:txBody>
+      </p:sp>
+      <p:sp>
+        <p:nvSpPr>
+          <p:cNvPr id="13" name="Rectangle 12"/>
+          <p:cNvSpPr/>
+          <p:nvPr/>
+        </p:nvSpPr>
+        <p:spPr>
+          <a:xfrm>
+            <a:off x="8510202" y="1842404"/>
+            <a:ext cx="2539438" cy="1632857"/>
+          </a:xfrm>
+          <a:prstGeom prst="rect">
+            <a:avLst/>
+          </a:prstGeom>
+          <a:solidFill>
+            <a:schemeClr val="accent1">
+              <a:lumMod val="60000"/>
+              <a:lumOff val="40000"/>
+            </a:schemeClr>
+          </a:solidFill>
+          <a:ln>
+            <a:solidFill>
+              <a:schemeClr val="accent1"/>
+            </a:solidFill>
+          </a:ln>
+        </p:spPr>
+        <p:style>
+          <a:lnRef idx="2">
+            <a:schemeClr val="accent1">
+              <a:shade val="50000"/>
+            </a:schemeClr>
+          </a:lnRef>
+          <a:fillRef idx="1">
+            <a:schemeClr val="accent1"/>
+          </a:fillRef>
+          <a:effectRef idx="0">
+            <a:schemeClr val="accent1"/>
+          </a:effectRef>
+          <a:fontRef idx="minor">
+            <a:schemeClr val="lt1"/>
+          </a:fontRef>
+        </p:style>
+        <p:txBody>
+          <a:bodyPr rtlCol="0" anchor="ctr"/>
+          <a:lstStyle/>
+          <a:p>
+            <a:pPr algn="ctr"/>
+            <a:endParaRPr lang="en-US" dirty="0"/>
+          </a:p>
+        </p:txBody>
+      </p:sp>
+      <p:sp>
+        <p:nvSpPr>
+          <p:cNvPr id="14" name="Rectangle 13"/>
+          <p:cNvSpPr/>
+          <p:nvPr/>
+        </p:nvSpPr>
+        <p:spPr>
+          <a:xfrm>
+            <a:off x="2220685" y="3995053"/>
+            <a:ext cx="2539438" cy="1632857"/>
+          </a:xfrm>
+          <a:prstGeom prst="rect">
+            <a:avLst/>
+          </a:prstGeom>
+          <a:solidFill>
+            <a:schemeClr val="accent1">
+              <a:lumMod val="60000"/>
+              <a:lumOff val="40000"/>
+            </a:schemeClr>
+          </a:solidFill>
+          <a:ln>
+            <a:solidFill>
+              <a:schemeClr val="accent1"/>
+            </a:solidFill>
+          </a:ln>
+        </p:spPr>
+        <p:style>
+          <a:lnRef idx="2">
+            <a:schemeClr val="accent1">
+              <a:shade val="50000"/>
+            </a:schemeClr>
+          </a:lnRef>
+          <a:fillRef idx="1">
+            <a:schemeClr val="accent1"/>
+          </a:fillRef>
+          <a:effectRef idx="0">
+            <a:schemeClr val="accent1"/>
+          </a:effectRef>
+          <a:fontRef idx="minor">
+            <a:schemeClr val="lt1"/>
+          </a:fontRef>
+        </p:style>
+        <p:txBody>
+          <a:bodyPr rtlCol="0" anchor="ctr"/>
+          <a:lstStyle/>
+          <a:p>
+            <a:pPr algn="ctr"/>
+            <a:endParaRPr lang="en-US" dirty="0"/>
+          </a:p>
+        </p:txBody>
+      </p:sp>
+      <p:sp>
+        <p:nvSpPr>
+          <p:cNvPr id="15" name="Rectangle 14"/>
+          <p:cNvSpPr/>
+          <p:nvPr/>
+        </p:nvSpPr>
+        <p:spPr>
+          <a:xfrm>
+            <a:off x="5271408" y="3995052"/>
+            <a:ext cx="2539438" cy="1632857"/>
+          </a:xfrm>
+          <a:prstGeom prst="rect">
+            <a:avLst/>
+          </a:prstGeom>
+          <a:solidFill>
+            <a:schemeClr val="accent1">
+              <a:lumMod val="60000"/>
+              <a:lumOff val="40000"/>
+            </a:schemeClr>
+          </a:solidFill>
+          <a:ln>
+            <a:solidFill>
+              <a:schemeClr val="accent1"/>
+            </a:solidFill>
+          </a:ln>
+        </p:spPr>
+        <p:style>
+          <a:lnRef idx="2">
+            <a:schemeClr val="accent1">
+              <a:shade val="50000"/>
+            </a:schemeClr>
+          </a:lnRef>
+          <a:fillRef idx="1">
+            <a:schemeClr val="accent1"/>
+          </a:fillRef>
+          <a:effectRef idx="0">
+            <a:schemeClr val="accent1"/>
+          </a:effectRef>
+          <a:fontRef idx="minor">
+            <a:schemeClr val="lt1"/>
+          </a:fontRef>
+        </p:style>
+        <p:txBody>
+          <a:bodyPr rtlCol="0" anchor="ctr"/>
+          <a:lstStyle/>
+          <a:p>
+            <a:pPr algn="ctr"/>
+            <a:endParaRPr lang="en-US" dirty="0"/>
+          </a:p>
+        </p:txBody>
+      </p:sp>
+      <p:sp>
+        <p:nvSpPr>
+          <p:cNvPr id="16" name="Rectangle 15"/>
+          <p:cNvSpPr/>
+          <p:nvPr/>
+        </p:nvSpPr>
+        <p:spPr>
+          <a:xfrm>
+            <a:off x="8472398" y="3995051"/>
+            <a:ext cx="2539438" cy="1632857"/>
+          </a:xfrm>
+          <a:prstGeom prst="rect">
+            <a:avLst/>
+          </a:prstGeom>
+          <a:solidFill>
+            <a:schemeClr val="accent1">
+              <a:lumMod val="60000"/>
+              <a:lumOff val="40000"/>
+            </a:schemeClr>
+          </a:solidFill>
+          <a:ln>
+            <a:solidFill>
+              <a:schemeClr val="accent1"/>
+            </a:solidFill>
+          </a:ln>
+        </p:spPr>
+        <p:style>
+          <a:lnRef idx="2">
+            <a:schemeClr val="accent1">
+              <a:shade val="50000"/>
+            </a:schemeClr>
+          </a:lnRef>
+          <a:fillRef idx="1">
+            <a:schemeClr val="accent1"/>
+          </a:fillRef>
+          <a:effectRef idx="0">
+            <a:schemeClr val="accent1"/>
+          </a:effectRef>
+          <a:fontRef idx="minor">
+            <a:schemeClr val="lt1"/>
+          </a:fontRef>
+        </p:style>
+        <p:txBody>
+          <a:bodyPr rtlCol="0" anchor="ctr"/>
+          <a:lstStyle/>
+          <a:p>
+            <a:pPr algn="ctr"/>
+            <a:endParaRPr lang="en-US" dirty="0"/>
+          </a:p>
+        </p:txBody>
+      </p:sp>
+    </p:spTree>
+    <p:extLst>
+      <p:ext uri="{BB962C8B-B14F-4D97-AF65-F5344CB8AC3E}">
+        <p14:creationId xmlns:p14="http://schemas.microsoft.com/office/powerpoint/2010/main" val="607812016"/>
+      </p:ext>
+    </p:extLst>
+  </p:cSld>
+  <p:clrMapOvr>
+    <a:masterClrMapping/>
+  </p:clrMapOvr>
+</p:sld>
+</file>
+
+<file path=ppt/slides/slide8.xml><?xml version="1.0" encoding="utf-8"?>
+<p:sld xmlns:a="http://schemas.openxmlformats.org/drawingml/2006/main" xmlns:r="http://schemas.openxmlformats.org/officeDocument/2006/relationships" xmlns:p="http://schemas.openxmlformats.org/presentationml/2006/main">
+  <p:cSld>
+    <p:spTree>
+      <p:nvGrpSpPr>
+        <p:cNvPr id="1" name=""/>
+        <p:cNvGrpSpPr/>
+        <p:nvPr/>
+      </p:nvGrpSpPr>
+      <p:grpSpPr>
+        <a:xfrm>
+          <a:off x="0" y="0"/>
+          <a:ext cx="0" cy="0"/>
+          <a:chOff x="0" y="0"/>
+          <a:chExt cx="0" cy="0"/>
+        </a:xfrm>
+      </p:grpSpPr>
+      <p:sp>
+        <p:nvSpPr>
+          <p:cNvPr id="2" name="Title 1"/>
+          <p:cNvSpPr>
+            <a:spLocks noGrp="1"/>
+          </p:cNvSpPr>
+          <p:nvPr>
+            <p:ph type="title"/>
+          </p:nvPr>
+        </p:nvSpPr>
+        <p:spPr/>
+        <p:txBody>
+          <a:bodyPr/>
+          <a:lstStyle/>
+          <a:p>
+            <a:endParaRPr lang="en-US"/>
+          </a:p>
+        </p:txBody>
+      </p:sp>
+      <p:sp>
+        <p:nvSpPr>
+          <p:cNvPr id="3" name="Content Placeholder 2"/>
+          <p:cNvSpPr>
+            <a:spLocks noGrp="1"/>
+          </p:cNvSpPr>
+          <p:nvPr>
+            <p:ph idx="1"/>
+          </p:nvPr>
+        </p:nvSpPr>
+        <p:spPr/>
+        <p:txBody>
+          <a:bodyPr/>
+          <a:lstStyle/>
+          <a:p>
+            <a:endParaRPr lang="en-US"/>
+          </a:p>
+        </p:txBody>
+      </p:sp>
+    </p:spTree>
+    <p:extLst>
+      <p:ext uri="{BB962C8B-B14F-4D97-AF65-F5344CB8AC3E}">
+        <p14:creationId xmlns:p14="http://schemas.microsoft.com/office/powerpoint/2010/main" val="2198958113"/>
+      </p:ext>
+    </p:extLst>
+  </p:cSld>
+  <p:clrMapOvr>
+    <a:masterClrMapping/>
+  </p:clrMapOvr>
+</p:sld>
+</file>
+
+<file path=ppt/slides/slide9.xml><?xml version="1.0" encoding="utf-8"?>
+<p:sld xmlns:a="http://schemas.openxmlformats.org/drawingml/2006/main" xmlns:r="http://schemas.openxmlformats.org/officeDocument/2006/relationships" xmlns:p="http://schemas.openxmlformats.org/presentationml/2006/main">
+  <p:cSld>
+    <p:spTree>
+      <p:nvGrpSpPr>
+        <p:cNvPr id="1" name=""/>
+        <p:cNvGrpSpPr/>
+        <p:nvPr/>
+      </p:nvGrpSpPr>
+      <p:grpSpPr>
+        <a:xfrm>
+          <a:off x="0" y="0"/>
+          <a:ext cx="0" cy="0"/>
+          <a:chOff x="0" y="0"/>
+          <a:chExt cx="0" cy="0"/>
+        </a:xfrm>
+      </p:grpSpPr>
+      <p:sp>
+        <p:nvSpPr>
           <p:cNvPr id="8194" name="Title 1"/>
           <p:cNvSpPr>
             <a:spLocks noGrp="1" noChangeArrowheads="1"/>
@@ -7092,7 +8837,7 @@
           <p:cNvPr id="2" name="Picture 2" descr="A screenshot of a cell phone&#10;&#10;Description generated with very high confidence">
             <a:extLst>
               <a:ext uri="{FF2B5EF4-FFF2-40B4-BE49-F238E27FC236}">
-                <a16:creationId xmlns:a16="http://schemas.microsoft.com/office/drawing/2014/main" id="{8031E89A-CB39-4DEA-9AA4-4C75F0B620D8}"/>
+                <a16:creationId xmlns:a16="http://schemas.microsoft.com/office/drawing/2014/main" xmlns="" id="{8031E89A-CB39-4DEA-9AA4-4C75F0B620D8}"/>
               </a:ext>
             </a:extLst>
           </p:cNvPr>
@@ -7117,245 +8862,6 @@
           </a:prstGeom>
         </p:spPr>
       </p:pic>
-    </p:spTree>
-  </p:cSld>
-  <p:clrMapOvr>
-    <a:masterClrMapping/>
-  </p:clrMapOvr>
-</p:sld>
-</file>
-
-<file path=ppt/slides/slide4.xml><?xml version="1.0" encoding="utf-8"?>
-<p:sld xmlns:a="http://schemas.openxmlformats.org/drawingml/2006/main" xmlns:r="http://schemas.openxmlformats.org/officeDocument/2006/relationships" xmlns:p="http://schemas.openxmlformats.org/presentationml/2006/main">
-  <p:cSld>
-    <p:spTree>
-      <p:nvGrpSpPr>
-        <p:cNvPr id="1" name=""/>
-        <p:cNvGrpSpPr/>
-        <p:nvPr/>
-      </p:nvGrpSpPr>
-      <p:grpSpPr>
-        <a:xfrm>
-          <a:off x="0" y="0"/>
-          <a:ext cx="0" cy="0"/>
-          <a:chOff x="0" y="0"/>
-          <a:chExt cx="0" cy="0"/>
-        </a:xfrm>
-      </p:grpSpPr>
-      <p:sp>
-        <p:nvSpPr>
-          <p:cNvPr id="9218" name="Title 1"/>
-          <p:cNvSpPr>
-            <a:spLocks noGrp="1" noChangeArrowheads="1"/>
-          </p:cNvSpPr>
-          <p:nvPr>
-            <p:ph type="title"/>
-          </p:nvPr>
-        </p:nvSpPr>
-        <p:spPr>
-          <a:xfrm>
-            <a:off x="1484313" y="152400"/>
-            <a:ext cx="10018712" cy="1752600"/>
-          </a:xfrm>
-        </p:spPr>
-        <p:txBody>
-          <a:bodyPr/>
-          <a:lstStyle/>
-          <a:p>
-            <a:r>
-              <a:rPr lang="en-US" altLang="en-US">
-                <a:ln>
-                  <a:noFill/>
-                </a:ln>
-              </a:rPr>
-              <a:t>Group reflection</a:t>
-            </a:r>
-            <a:endParaRPr lang="en-CA" altLang="en-US">
-              <a:ln>
-                <a:noFill/>
-              </a:ln>
-            </a:endParaRPr>
-          </a:p>
-        </p:txBody>
-      </p:sp>
-      <p:sp>
-        <p:nvSpPr>
-          <p:cNvPr id="3" name="Content Placeholder 2">
-            <a:extLst/>
-          </p:cNvPr>
-          <p:cNvSpPr>
-            <a:spLocks noGrp="1"/>
-          </p:cNvSpPr>
-          <p:nvPr>
-            <p:ph idx="1"/>
-          </p:nvPr>
-        </p:nvSpPr>
-        <p:spPr>
-          <a:xfrm>
-            <a:off x="1484313" y="1905000"/>
-            <a:ext cx="10018712" cy="3886200"/>
-          </a:xfrm>
-        </p:spPr>
-        <p:txBody>
-          <a:bodyPr rtlCol="0">
-            <a:normAutofit fontScale="85000" lnSpcReduction="10000"/>
-          </a:bodyPr>
-          <a:lstStyle/>
-          <a:p>
-            <a:pPr fontAlgn="auto">
-              <a:spcAft>
-                <a:spcPts val="0"/>
-              </a:spcAft>
-              <a:buClr>
-                <a:schemeClr val="accent1">
-                  <a:lumMod val="75000"/>
-                </a:schemeClr>
-              </a:buClr>
-              <a:buFont typeface="Arial"/>
-              <a:buChar char="•"/>
-              <a:defRPr/>
-            </a:pPr>
-            <a:r>
-              <a:rPr lang="en-US" dirty="0"/>
-              <a:t>How did you feel about this milestone? What did you like about it? What did you dislike?</a:t>
-            </a:r>
-          </a:p>
-          <a:p>
-            <a:pPr lvl="1" fontAlgn="auto">
-              <a:spcAft>
-                <a:spcPts val="0"/>
-              </a:spcAft>
-              <a:buClr>
-                <a:schemeClr val="accent1">
-                  <a:lumMod val="75000"/>
-                </a:schemeClr>
-              </a:buClr>
-              <a:buFont typeface="Arial"/>
-              <a:buChar char="•"/>
-              <a:defRPr/>
-            </a:pPr>
-            <a:r>
-              <a:rPr lang="en-US" dirty="0"/>
-              <a:t>The milestone was enjoyable to make, it was nice to take a topic we learned in a previous class and expand on it by creating a user story map.</a:t>
-            </a:r>
-          </a:p>
-          <a:p>
-            <a:pPr fontAlgn="auto">
-              <a:spcAft>
-                <a:spcPts val="0"/>
-              </a:spcAft>
-              <a:buClr>
-                <a:schemeClr val="accent1">
-                  <a:lumMod val="75000"/>
-                </a:schemeClr>
-              </a:buClr>
-              <a:buFont typeface="Arial"/>
-              <a:buChar char="•"/>
-              <a:defRPr/>
-            </a:pPr>
-            <a:r>
-              <a:rPr lang="en-US" dirty="0"/>
-              <a:t>What did you learn about yourself as you collaborated and worked through this milestone?</a:t>
-            </a:r>
-          </a:p>
-          <a:p>
-            <a:pPr lvl="1" fontAlgn="auto">
-              <a:spcAft>
-                <a:spcPts val="0"/>
-              </a:spcAft>
-              <a:buClr>
-                <a:schemeClr val="accent1">
-                  <a:lumMod val="75000"/>
-                </a:schemeClr>
-              </a:buClr>
-              <a:buFont typeface="Arial"/>
-              <a:buChar char="•"/>
-              <a:defRPr/>
-            </a:pPr>
-            <a:r>
-              <a:rPr lang="en-US" dirty="0"/>
-              <a:t>We each had our own version of how the USM would look and it was interesting to collaborate our ideas into the design we showed today.</a:t>
-            </a:r>
-          </a:p>
-          <a:p>
-            <a:pPr fontAlgn="auto">
-              <a:spcAft>
-                <a:spcPts val="0"/>
-              </a:spcAft>
-              <a:buClr>
-                <a:schemeClr val="accent1">
-                  <a:lumMod val="75000"/>
-                </a:schemeClr>
-              </a:buClr>
-              <a:buFont typeface="Arial"/>
-              <a:buChar char="•"/>
-              <a:defRPr/>
-            </a:pPr>
-            <a:r>
-              <a:rPr lang="en-US" dirty="0"/>
-              <a:t>How will you use what you have learned going forward?</a:t>
-            </a:r>
-          </a:p>
-          <a:p>
-            <a:pPr lvl="1" fontAlgn="auto">
-              <a:spcAft>
-                <a:spcPts val="0"/>
-              </a:spcAft>
-              <a:buClr>
-                <a:schemeClr val="accent1">
-                  <a:lumMod val="75000"/>
-                </a:schemeClr>
-              </a:buClr>
-              <a:buFont typeface="Arial"/>
-              <a:buChar char="•"/>
-              <a:defRPr/>
-            </a:pPr>
-            <a:r>
-              <a:rPr lang="en-US" dirty="0"/>
-              <a:t>The user story map really breaks down what we will need to code and how the structure of the program will look</a:t>
-            </a:r>
-          </a:p>
-          <a:p>
-            <a:pPr fontAlgn="auto">
-              <a:spcAft>
-                <a:spcPts val="0"/>
-              </a:spcAft>
-              <a:buClr>
-                <a:schemeClr val="accent1">
-                  <a:lumMod val="75000"/>
-                </a:schemeClr>
-              </a:buClr>
-              <a:buFont typeface="Arial"/>
-              <a:buChar char="•"/>
-              <a:defRPr/>
-            </a:pPr>
-            <a:r>
-              <a:rPr lang="en-US" dirty="0"/>
-              <a:t>What “stuff &amp; things” related to this milestone would you want help with?</a:t>
-            </a:r>
-          </a:p>
-          <a:p>
-            <a:pPr lvl="1" fontAlgn="auto">
-              <a:spcAft>
-                <a:spcPts val="0"/>
-              </a:spcAft>
-              <a:buClr>
-                <a:schemeClr val="accent1">
-                  <a:lumMod val="75000"/>
-                </a:schemeClr>
-              </a:buClr>
-              <a:buFont typeface="Arial"/>
-              <a:buChar char="•"/>
-              <a:defRPr/>
-            </a:pPr>
-            <a:r>
-              <a:rPr lang="en-US" dirty="0"/>
-              <a:t>The User Story Map was the first thing of real depth we needed to accomplish and it was enjoyable to plan it out in our own way and create it.</a:t>
-            </a:r>
-            <a:endParaRPr lang="en-CA" dirty="0"/>
-          </a:p>
-        </p:txBody>
-      </p:sp>
     </p:spTree>
   </p:cSld>
   <p:clrMapOvr>
@@ -7407,7 +8913,7 @@
     </a:clrScheme>
     <a:fontScheme name="Parallax">
       <a:majorFont>
-        <a:latin typeface="Corbel" panose="020B0503020204020204"/>
+        <a:latin typeface="Corbel"/>
         <a:ea typeface=""/>
         <a:cs typeface=""/>
         <a:font script="Jpan" typeface="HGｺﾞｼｯｸM"/>
@@ -7442,7 +8948,7 @@
         <a:font script="Geor" typeface="Sylfaen"/>
       </a:majorFont>
       <a:minorFont>
-        <a:latin typeface="Corbel" panose="020B0503020204020204"/>
+        <a:latin typeface="Corbel"/>
         <a:ea typeface=""/>
         <a:cs typeface=""/>
         <a:font script="Jpan" typeface="HGｺﾞｼｯｸM"/>
@@ -7614,7 +9120,7 @@
   <a:extraClrSchemeLst/>
   <a:extLst>
     <a:ext uri="{05A4C25C-085E-4340-85A3-A5531E510DB2}">
-      <thm15:themeFamily xmlns:thm15="http://schemas.microsoft.com/office/thememl/2012/main" name="Parallax" id="{3388167B-A2EB-4685-9635-1831D9AEF8C4}" vid="{4F7A876A-7598-49CA-AFC8-8EDA2551E4A7}"/>
+      <thm15:themeFamily xmlns:thm15="http://schemas.microsoft.com/office/thememl/2012/main" xmlns="" name="Parallax" id="{3388167B-A2EB-4685-9635-1831D9AEF8C4}" vid="{4F7A876A-7598-49CA-AFC8-8EDA2551E4A7}"/>
     </a:ext>
   </a:extLst>
 </a:theme>

</xml_diff>